<commit_message>
Fix minor typo in Ex 3 slide deck
</commit_message>
<xml_diff>
--- a/03 commandset.pptx
+++ b/03 commandset.pptx
@@ -274,7 +274,7 @@
               <a:rPr lang="en-US" smtClean="0">
                 <a:latin typeface="Segoe UI" pitchFamily="34" charset="0"/>
               </a:rPr>
-              <a:t>3/3/2019 9:45 AM</a:t>
+              <a:t>12/1/2019 5:24 PM</a:t>
             </a:fld>
             <a:endParaRPr lang="en-US" dirty="0">
               <a:latin typeface="Segoe UI" pitchFamily="34" charset="0"/>
@@ -571,7 +571,7 @@
           <a:p>
             <a:fld id="{D18B56EA-E28F-4F92-9F16-7A6F2501B303}" type="datetime8">
               <a:rPr lang="en-US" smtClean="0"/>
-              <a:t>3/3/2019 9:45 AM</a:t>
+              <a:t>12/1/2019 5:24 PM</a:t>
             </a:fld>
             <a:endParaRPr lang="en-US" dirty="0"/>
           </a:p>
@@ -954,7 +954,7 @@
           <a:p>
             <a:fld id="{D18B56EA-E28F-4F92-9F16-7A6F2501B303}" type="datetime8">
               <a:rPr lang="en-US" smtClean="0"/>
-              <a:t>3/3/2019 9:45 AM</a:t>
+              <a:t>12/1/2019 5:24 PM</a:t>
             </a:fld>
             <a:endParaRPr lang="en-US" dirty="0"/>
           </a:p>
@@ -1135,7 +1135,7 @@
           <a:p>
             <a:fld id="{D18B56EA-E28F-4F92-9F16-7A6F2501B303}" type="datetime8">
               <a:rPr lang="en-US" smtClean="0"/>
-              <a:t>3/3/2019 9:45 AM</a:t>
+              <a:t>12/1/2019 5:24 PM</a:t>
             </a:fld>
             <a:endParaRPr lang="en-US" dirty="0"/>
           </a:p>
@@ -1320,7 +1320,7 @@
           <a:p>
             <a:fld id="{D18B56EA-E28F-4F92-9F16-7A6F2501B303}" type="datetime8">
               <a:rPr lang="en-US" smtClean="0"/>
-              <a:t>3/3/2019 9:45 AM</a:t>
+              <a:t>12/1/2019 5:24 PM</a:t>
             </a:fld>
             <a:endParaRPr lang="en-US" dirty="0"/>
           </a:p>
@@ -1501,7 +1501,7 @@
           <a:p>
             <a:fld id="{D18B56EA-E28F-4F92-9F16-7A6F2501B303}" type="datetime8">
               <a:rPr lang="en-US" smtClean="0"/>
-              <a:t>3/3/2019 9:45 AM</a:t>
+              <a:t>12/1/2019 5:24 PM</a:t>
             </a:fld>
             <a:endParaRPr lang="en-US" dirty="0"/>
           </a:p>
@@ -1682,7 +1682,7 @@
           <a:p>
             <a:fld id="{D18B56EA-E28F-4F92-9F16-7A6F2501B303}" type="datetime8">
               <a:rPr lang="en-US" smtClean="0"/>
-              <a:t>3/3/2019 9:45 AM</a:t>
+              <a:t>12/1/2019 5:24 PM</a:t>
             </a:fld>
             <a:endParaRPr lang="en-US" dirty="0"/>
           </a:p>
@@ -1863,7 +1863,7 @@
           <a:p>
             <a:fld id="{D18B56EA-E28F-4F92-9F16-7A6F2501B303}" type="datetime8">
               <a:rPr lang="en-US" smtClean="0"/>
-              <a:t>3/3/2019 9:45 AM</a:t>
+              <a:t>12/1/2019 5:24 PM</a:t>
             </a:fld>
             <a:endParaRPr lang="en-US" dirty="0"/>
           </a:p>
@@ -2044,7 +2044,7 @@
           <a:p>
             <a:fld id="{D18B56EA-E28F-4F92-9F16-7A6F2501B303}" type="datetime8">
               <a:rPr lang="en-US" smtClean="0"/>
-              <a:t>3/3/2019 9:45 AM</a:t>
+              <a:t>12/1/2019 5:24 PM</a:t>
             </a:fld>
             <a:endParaRPr lang="en-US" dirty="0"/>
           </a:p>
@@ -15673,13 +15673,13 @@
               <a:rPr lang="en-US" sz="1800" dirty="0">
                 <a:latin typeface="+mj-lt"/>
               </a:rPr>
-              <a:t>Build your First  </a:t>
-            </a:r>
-            <a:r>
-              <a:rPr lang="en-US" sz="1800" dirty="0" err="1">
+              <a:t>Build your </a:t>
+            </a:r>
+            <a:r>
+              <a:rPr lang="en-US" sz="1800">
                 <a:latin typeface="+mj-lt"/>
               </a:rPr>
-              <a:t>ListView</a:t>
+              <a:t>First ListView</a:t>
             </a:r>
             <a:r>
               <a:rPr lang="en-US" sz="1800" dirty="0">

</xml_diff>

<commit_message>
Update side deck 3
</commit_message>
<xml_diff>
--- a/03 commandset.pptx
+++ b/03 commandset.pptx
@@ -270,7 +270,7 @@
               <a:rPr lang="en-US" smtClean="0">
                 <a:latin typeface="Segoe UI" pitchFamily="34" charset="0"/>
               </a:rPr>
-              <a:t>8/29/2020 8:56 AM</a:t>
+              <a:t>10/31/2021 2:09 PM</a:t>
             </a:fld>
             <a:endParaRPr lang="en-US" dirty="0">
               <a:latin typeface="Segoe UI" pitchFamily="34" charset="0"/>
@@ -567,7 +567,7 @@
           <a:p>
             <a:fld id="{D18B56EA-E28F-4F92-9F16-7A6F2501B303}" type="datetime8">
               <a:rPr lang="en-US" smtClean="0"/>
-              <a:t>8/29/2020 8:56 AM</a:t>
+              <a:t>10/31/2021 2:09 PM</a:t>
             </a:fld>
             <a:endParaRPr lang="en-US" dirty="0"/>
           </a:p>
@@ -950,7 +950,7 @@
           <a:p>
             <a:fld id="{D18B56EA-E28F-4F92-9F16-7A6F2501B303}" type="datetime8">
               <a:rPr lang="en-US" smtClean="0"/>
-              <a:t>8/29/2020 8:56 AM</a:t>
+              <a:t>10/31/2021 2:09 PM</a:t>
             </a:fld>
             <a:endParaRPr lang="en-US" dirty="0"/>
           </a:p>
@@ -1131,7 +1131,7 @@
           <a:p>
             <a:fld id="{D18B56EA-E28F-4F92-9F16-7A6F2501B303}" type="datetime8">
               <a:rPr lang="en-US" smtClean="0"/>
-              <a:t>8/29/2020 8:56 AM</a:t>
+              <a:t>10/31/2021 2:09 PM</a:t>
             </a:fld>
             <a:endParaRPr lang="en-US" dirty="0"/>
           </a:p>
@@ -1312,7 +1312,7 @@
           <a:p>
             <a:fld id="{D18B56EA-E28F-4F92-9F16-7A6F2501B303}" type="datetime8">
               <a:rPr lang="en-US" smtClean="0"/>
-              <a:t>8/29/2020 8:56 AM</a:t>
+              <a:t>10/31/2021 2:09 PM</a:t>
             </a:fld>
             <a:endParaRPr lang="en-US" dirty="0"/>
           </a:p>
@@ -1499,7 +1499,7 @@
           <a:p>
             <a:fld id="{D18B56EA-E28F-4F92-9F16-7A6F2501B303}" type="datetime8">
               <a:rPr lang="en-US" smtClean="0"/>
-              <a:t>8/29/2020 8:56 AM</a:t>
+              <a:t>10/31/2021 2:09 PM</a:t>
             </a:fld>
             <a:endParaRPr lang="en-US" dirty="0"/>
           </a:p>
@@ -1740,7 +1740,7 @@
           <a:p>
             <a:fld id="{D18B56EA-E28F-4F92-9F16-7A6F2501B303}" type="datetime8">
               <a:rPr lang="en-US" smtClean="0"/>
-              <a:t>8/29/2020 8:56 AM</a:t>
+              <a:t>10/31/2021 2:09 PM</a:t>
             </a:fld>
             <a:endParaRPr lang="en-US" dirty="0"/>
           </a:p>
@@ -1949,7 +1949,7 @@
           <a:p>
             <a:fld id="{D18B56EA-E28F-4F92-9F16-7A6F2501B303}" type="datetime8">
               <a:rPr lang="en-US" smtClean="0"/>
-              <a:t>8/29/2020 8:56 AM</a:t>
+              <a:t>10/31/2021 2:09 PM</a:t>
             </a:fld>
             <a:endParaRPr lang="en-US" dirty="0"/>
           </a:p>
@@ -2249,7 +2249,7 @@
           <a:p>
             <a:fld id="{D18B56EA-E28F-4F92-9F16-7A6F2501B303}" type="datetime8">
               <a:rPr lang="en-US" smtClean="0"/>
-              <a:t>8/29/2020 8:56 AM</a:t>
+              <a:t>10/31/2021 2:09 PM</a:t>
             </a:fld>
             <a:endParaRPr lang="en-US" dirty="0"/>
           </a:p>
@@ -2338,16 +2338,7 @@
           <a:p>
             <a:r>
               <a:rPr lang="en-US" dirty="0"/>
-              <a:t>Now let's look at how you can debug and test SharePoint Framework command set extensions. Unlike client-side web parts, extensions require a live SharePoint site, list, or library. This means you can't test extensions in either the local or SharePoint-hosted workbench. You can still build and host extensions projects locally while debugging and testing in a remote SharePoint site.</a:t>
-            </a:r>
-          </a:p>
-          <a:p>
-            <a:endParaRPr lang="en-US" dirty="0"/>
-          </a:p>
-          <a:p>
-            <a:r>
-              <a:rPr lang="en-US" dirty="0"/>
-              <a:t>The testing experience is similar to the experience when you use the hosted SharePoint workbench for a web part development testing and debugging.</a:t>
+              <a:t>Now let's look at how you can debug and test SharePoint Framework command set extensions. The SharePoint workbench doesn't support testing extensions. However, you can still build and host extensions projects locally while debugging and testing in a remote SharePoint site.</a:t>
             </a:r>
           </a:p>
           <a:p>
@@ -2527,7 +2518,7 @@
           <a:p>
             <a:fld id="{D18B56EA-E28F-4F92-9F16-7A6F2501B303}" type="datetime8">
               <a:rPr lang="en-US" smtClean="0"/>
-              <a:t>8/29/2020 8:56 AM</a:t>
+              <a:t>10/31/2021 2:09 PM</a:t>
             </a:fld>
             <a:endParaRPr lang="en-US" dirty="0"/>
           </a:p>
@@ -2743,7 +2734,7 @@
           <a:p>
             <a:fld id="{D18B56EA-E28F-4F92-9F16-7A6F2501B303}" type="datetime8">
               <a:rPr lang="en-US" smtClean="0"/>
-              <a:t>8/29/2020 8:56 AM</a:t>
+              <a:t>10/31/2021 2:09 PM</a:t>
             </a:fld>
             <a:endParaRPr lang="en-US" dirty="0"/>
           </a:p>
@@ -2924,7 +2915,7 @@
           <a:p>
             <a:fld id="{D18B56EA-E28F-4F92-9F16-7A6F2501B303}" type="datetime8">
               <a:rPr lang="en-US" smtClean="0"/>
-              <a:t>8/29/2020 8:56 AM</a:t>
+              <a:t>10/31/2021 2:09 PM</a:t>
             </a:fld>
             <a:endParaRPr lang="en-US" dirty="0"/>
           </a:p>
@@ -3105,7 +3096,7 @@
           <a:p>
             <a:fld id="{D18B56EA-E28F-4F92-9F16-7A6F2501B303}" type="datetime8">
               <a:rPr lang="en-US" smtClean="0"/>
-              <a:t>8/29/2020 8:56 AM</a:t>
+              <a:t>10/31/2021 2:09 PM</a:t>
             </a:fld>
             <a:endParaRPr lang="en-US" dirty="0"/>
           </a:p>
@@ -17357,7 +17348,7 @@
         <p:spPr>
           <a:xfrm>
             <a:off x="464400" y="1212850"/>
-            <a:ext cx="11574000" cy="3360920"/>
+            <a:ext cx="11574000" cy="2806922"/>
           </a:xfrm>
         </p:spPr>
         <p:txBody>
@@ -17366,7 +17357,7 @@
           <a:p>
             <a:r>
               <a:rPr lang="en-US" dirty="0"/>
-              <a:t>Unlike web parts, extensions require a live SharePoint list and/or library</a:t>
+              <a:t>The SharePoint workbench doesn't support testing extensions</a:t>
             </a:r>
           </a:p>
           <a:p>
@@ -17376,20 +17367,6 @@
             <a:r>
               <a:rPr lang="en-US" dirty="0"/>
               <a:t>Can still build and host extension project locally while testing in a remote SharePoint site</a:t>
-            </a:r>
-          </a:p>
-          <a:p>
-            <a:pPr lvl="1"/>
-            <a:r>
-              <a:rPr lang="en-US" dirty="0"/>
-              <a:t>Similar experience to using hosted SharePoint workbench for </a:t>
-            </a:r>
-            <a:br>
-              <a:rPr lang="en-US" dirty="0"/>
-            </a:br>
-            <a:r>
-              <a:rPr lang="en-US" dirty="0"/>
-              <a:t>web part development, testing &amp; debugging</a:t>
             </a:r>
           </a:p>
           <a:p>

</xml_diff>